<commit_message>
these are new files and updates from lxplus Also the DCS_paper received from Giannis Also vradya_erevniti poster made with Lisa
</commit_message>
<xml_diff>
--- a/Documents for Progress/topTagger_QCDClosure_17Sept2019.pptx
+++ b/Documents for Progress/topTagger_QCDClosure_17Sept2019.pptx
@@ -6,10 +6,10 @@
     <p:sldMasterId id="2147483661" r:id="rId2"/>
   </p:sldMasterIdLst>
   <p:notesMasterIdLst>
-    <p:notesMasterId r:id="rId14"/>
+    <p:notesMasterId r:id="rId12"/>
   </p:notesMasterIdLst>
   <p:handoutMasterIdLst>
-    <p:handoutMasterId r:id="rId15"/>
+    <p:handoutMasterId r:id="rId13"/>
   </p:handoutMasterIdLst>
   <p:sldIdLst>
     <p:sldId id="256" r:id="rId3"/>
@@ -19,10 +19,8 @@
     <p:sldId id="445" r:id="rId7"/>
     <p:sldId id="446" r:id="rId8"/>
     <p:sldId id="450" r:id="rId9"/>
-    <p:sldId id="451" r:id="rId10"/>
-    <p:sldId id="452" r:id="rId11"/>
-    <p:sldId id="453" r:id="rId12"/>
-    <p:sldId id="454" r:id="rId13"/>
+    <p:sldId id="453" r:id="rId10"/>
+    <p:sldId id="454" r:id="rId11"/>
   </p:sldIdLst>
   <p:sldSz cx="12192000" cy="6858000"/>
   <p:notesSz cx="6858000" cy="9144000"/>
@@ -214,7 +212,7 @@
           <a:p>
             <a:fld id="{0DAA3570-B70D-4A9F-9B63-1659E97590CB}" type="datetime1">
               <a:rPr lang="en-GB" smtClean="0"/>
-              <a:t>17/09/2019</a:t>
+              <a:t>20/09/2019</a:t>
             </a:fld>
             <a:endParaRPr lang="en-GB"/>
           </a:p>
@@ -420,7 +418,7 @@
           <a:p>
             <a:fld id="{E1E1338F-B435-4DF6-9AE3-7F65274EBD0A}" type="datetime1">
               <a:rPr lang="en-GB" smtClean="0"/>
-              <a:t>17/09/2019</a:t>
+              <a:t>20/09/2019</a:t>
             </a:fld>
             <a:endParaRPr lang="en-GB"/>
           </a:p>
@@ -754,7 +752,7 @@
           <a:p>
             <a:fld id="{0D7E851C-70F9-4D76-BF3E-4E54C77E096E}" type="datetime1">
               <a:rPr lang="en-GB" smtClean="0"/>
-              <a:t>17/09/2019</a:t>
+              <a:t>20/09/2019</a:t>
             </a:fld>
             <a:endParaRPr lang="en-GB"/>
           </a:p>
@@ -1022,7 +1020,7 @@
           <a:p>
             <a:fld id="{6F70CC3F-F4F0-46BB-A868-7CB1CC7F36E9}" type="datetime1">
               <a:rPr lang="en-US" smtClean="0"/>
-              <a:t>9/17/19</a:t>
+              <a:t>9/20/19</a:t>
             </a:fld>
             <a:endParaRPr lang="en-US" dirty="0"/>
           </a:p>
@@ -1229,7 +1227,7 @@
           <a:p>
             <a:fld id="{C6B24137-F447-45C5-ADDB-1DEE88B977EB}" type="datetime1">
               <a:rPr lang="en-US" smtClean="0"/>
-              <a:t>9/17/19</a:t>
+              <a:t>9/20/19</a:t>
             </a:fld>
             <a:endParaRPr lang="en-US" dirty="0"/>
           </a:p>
@@ -1484,7 +1482,7 @@
           <a:p>
             <a:fld id="{A2452AD9-823E-445A-8840-DE1BA1407B0F}" type="datetime1">
               <a:rPr lang="en-US" smtClean="0"/>
-              <a:t>9/17/19</a:t>
+              <a:t>9/20/19</a:t>
             </a:fld>
             <a:endParaRPr lang="en-US" dirty="0"/>
           </a:p>
@@ -1675,7 +1673,7 @@
           <a:p>
             <a:fld id="{9D34335A-3586-434F-9D39-96B67E9D14E2}" type="datetime1">
               <a:rPr lang="en-US" smtClean="0"/>
-              <a:t>9/17/19</a:t>
+              <a:t>9/20/19</a:t>
             </a:fld>
             <a:endParaRPr lang="en-GB"/>
           </a:p>
@@ -1849,7 +1847,7 @@
           <a:p>
             <a:fld id="{38A3CDD1-24B3-4A83-94EC-BCABDEEF598E}" type="datetime1">
               <a:rPr lang="en-US" smtClean="0"/>
-              <a:t>9/17/19</a:t>
+              <a:t>9/20/19</a:t>
             </a:fld>
             <a:endParaRPr lang="en-GB"/>
           </a:p>
@@ -2099,7 +2097,7 @@
           <a:p>
             <a:fld id="{B598D5C6-59D9-4809-8643-02288EDFD862}" type="datetime1">
               <a:rPr lang="en-US" smtClean="0"/>
-              <a:t>9/17/19</a:t>
+              <a:t>9/20/19</a:t>
             </a:fld>
             <a:endParaRPr lang="en-GB"/>
           </a:p>
@@ -2335,7 +2333,7 @@
           <a:p>
             <a:fld id="{E8C49333-08CE-4959-8B20-6FFDB2AD2CE3}" type="datetime1">
               <a:rPr lang="en-US" smtClean="0"/>
-              <a:t>9/17/19</a:t>
+              <a:t>9/20/19</a:t>
             </a:fld>
             <a:endParaRPr lang="en-GB"/>
           </a:p>
@@ -2706,7 +2704,7 @@
           <a:p>
             <a:fld id="{A0244BB5-59A9-43D2-B40B-9C4DD1D9E810}" type="datetime1">
               <a:rPr lang="en-US" smtClean="0"/>
-              <a:t>9/17/19</a:t>
+              <a:t>9/20/19</a:t>
             </a:fld>
             <a:endParaRPr lang="en-GB"/>
           </a:p>
@@ -2828,7 +2826,7 @@
           <a:p>
             <a:fld id="{C52C7BD1-B5E6-431A-949E-151D673733DD}" type="datetime1">
               <a:rPr lang="en-US" smtClean="0"/>
-              <a:t>9/17/19</a:t>
+              <a:t>9/20/19</a:t>
             </a:fld>
             <a:endParaRPr lang="en-GB"/>
           </a:p>
@@ -2927,7 +2925,7 @@
           <a:p>
             <a:fld id="{383ACACC-B893-415F-8470-0AF677E741A8}" type="datetime1">
               <a:rPr lang="en-US" smtClean="0"/>
-              <a:t>9/17/19</a:t>
+              <a:t>9/20/19</a:t>
             </a:fld>
             <a:endParaRPr lang="en-GB"/>
           </a:p>
@@ -3208,7 +3206,7 @@
           <a:p>
             <a:fld id="{92C1EBAD-8585-4EAE-9D47-B8800D8018AA}" type="datetime1">
               <a:rPr lang="en-US" smtClean="0"/>
-              <a:t>9/17/19</a:t>
+              <a:t>9/20/19</a:t>
             </a:fld>
             <a:endParaRPr lang="en-GB"/>
           </a:p>
@@ -3364,7 +3362,7 @@
           <a:p>
             <a:fld id="{B8FDFAE3-A6AC-47F4-9F09-6BE9C0C0FB13}" type="datetime1">
               <a:rPr lang="en-US" smtClean="0"/>
-              <a:t>9/17/19</a:t>
+              <a:t>9/20/19</a:t>
             </a:fld>
             <a:endParaRPr lang="en-US" dirty="0"/>
           </a:p>
@@ -3645,7 +3643,7 @@
           <a:p>
             <a:fld id="{F64BBFAD-599D-4F86-B35F-B5DD90EE8D1C}" type="datetime1">
               <a:rPr lang="en-US" smtClean="0"/>
-              <a:t>9/17/19</a:t>
+              <a:t>9/20/19</a:t>
             </a:fld>
             <a:endParaRPr lang="en-GB"/>
           </a:p>
@@ -3819,7 +3817,7 @@
           <a:p>
             <a:fld id="{09A4C386-343A-4915-B90D-A61E2789050B}" type="datetime1">
               <a:rPr lang="en-US" smtClean="0"/>
-              <a:t>9/17/19</a:t>
+              <a:t>9/20/19</a:t>
             </a:fld>
             <a:endParaRPr lang="en-GB"/>
           </a:p>
@@ -4003,7 +4001,7 @@
           <a:p>
             <a:fld id="{68633DEC-0070-4E4F-9FB5-5650E1E5BE04}" type="datetime1">
               <a:rPr lang="en-US" smtClean="0"/>
-              <a:t>9/17/19</a:t>
+              <a:t>9/20/19</a:t>
             </a:fld>
             <a:endParaRPr lang="en-GB"/>
           </a:p>
@@ -4350,7 +4348,7 @@
           <a:p>
             <a:fld id="{627CEB96-F060-4BD0-A319-7DDBAD2330C7}" type="datetime1">
               <a:rPr lang="en-US" smtClean="0"/>
-              <a:t>9/17/19</a:t>
+              <a:t>9/20/19</a:t>
             </a:fld>
             <a:endParaRPr lang="en-US" dirty="0"/>
           </a:p>
@@ -4624,7 +4622,7 @@
           <a:p>
             <a:fld id="{544EC976-2A06-42F2-83D5-727A07C4432D}" type="datetime1">
               <a:rPr lang="en-US" smtClean="0"/>
-              <a:t>9/17/19</a:t>
+              <a:t>9/20/19</a:t>
             </a:fld>
             <a:endParaRPr lang="en-US" dirty="0"/>
           </a:p>
@@ -5002,7 +5000,7 @@
           <a:p>
             <a:fld id="{5AA39BAF-3515-4BA9-8721-0FD7C068E6CE}" type="datetime1">
               <a:rPr lang="en-US" smtClean="0"/>
-              <a:t>9/17/19</a:t>
+              <a:t>9/20/19</a:t>
             </a:fld>
             <a:endParaRPr lang="en-US" dirty="0"/>
           </a:p>
@@ -5119,7 +5117,7 @@
           <a:p>
             <a:fld id="{0BD7B019-E4B6-436B-9882-A2B77EE70AF1}" type="datetime1">
               <a:rPr lang="en-US" smtClean="0"/>
-              <a:t>9/17/19</a:t>
+              <a:t>9/20/19</a:t>
             </a:fld>
             <a:endParaRPr lang="en-US" dirty="0"/>
           </a:p>
@@ -5289,7 +5287,7 @@
           <a:p>
             <a:fld id="{91BE9073-E7C2-4887-95DE-832592E46858}" type="datetime1">
               <a:rPr lang="en-US" smtClean="0"/>
-              <a:t>9/17/19</a:t>
+              <a:t>9/20/19</a:t>
             </a:fld>
             <a:endParaRPr lang="en-US" dirty="0"/>
           </a:p>
@@ -5672,7 +5670,7 @@
           <a:p>
             <a:fld id="{00392B4E-FEAF-42BF-8CB0-15FC260E7913}" type="datetime1">
               <a:rPr lang="en-US" smtClean="0"/>
-              <a:t>9/17/19</a:t>
+              <a:t>9/20/19</a:t>
             </a:fld>
             <a:endParaRPr lang="en-US" dirty="0"/>
           </a:p>
@@ -6054,7 +6052,7 @@
           <a:p>
             <a:fld id="{572BCF8B-3E8E-431D-82BE-9E44782EED80}" type="datetime1">
               <a:rPr lang="en-US" smtClean="0"/>
-              <a:t>9/17/19</a:t>
+              <a:t>9/20/19</a:t>
             </a:fld>
             <a:endParaRPr lang="en-US" dirty="0"/>
           </a:p>
@@ -6339,7 +6337,7 @@
           <a:p>
             <a:fld id="{E36859CF-2FA5-4ECD-B70A-458D3733E031}" type="datetime1">
               <a:rPr lang="en-US" smtClean="0"/>
-              <a:t>9/17/19</a:t>
+              <a:t>9/20/19</a:t>
             </a:fld>
             <a:endParaRPr lang="en-US" dirty="0"/>
           </a:p>
@@ -7029,7 +7027,7 @@
           <a:p>
             <a:fld id="{9B0C0037-87E8-4271-BAB8-7377F3CDBABC}" type="datetime1">
               <a:rPr lang="en-US" smtClean="0"/>
-              <a:t>9/17/19</a:t>
+              <a:t>9/20/19</a:t>
             </a:fld>
             <a:endParaRPr lang="en-GB"/>
           </a:p>
@@ -7602,680 +7600,6 @@
 </p:sld>
 </file>
 
-<file path=ppt/slides/slide10.xml><?xml version="1.0" encoding="utf-8"?>
-<p:sld xmlns:a="http://schemas.openxmlformats.org/drawingml/2006/main" xmlns:r="http://schemas.openxmlformats.org/officeDocument/2006/relationships" xmlns:p="http://schemas.openxmlformats.org/presentationml/2006/main">
-  <p:cSld>
-    <p:spTree>
-      <p:nvGrpSpPr>
-        <p:cNvPr id="1" name=""/>
-        <p:cNvGrpSpPr/>
-        <p:nvPr/>
-      </p:nvGrpSpPr>
-      <p:grpSpPr>
-        <a:xfrm>
-          <a:off x="0" y="0"/>
-          <a:ext cx="0" cy="0"/>
-          <a:chOff x="0" y="0"/>
-          <a:chExt cx="0" cy="0"/>
-        </a:xfrm>
-      </p:grpSpPr>
-      <p:sp>
-        <p:nvSpPr>
-          <p:cNvPr id="3" name="Footer Placeholder 2"/>
-          <p:cNvSpPr>
-            <a:spLocks noGrp="1"/>
-          </p:cNvSpPr>
-          <p:nvPr>
-            <p:ph type="ftr" sz="quarter" idx="11"/>
-          </p:nvPr>
-        </p:nvSpPr>
-        <p:spPr/>
-        <p:txBody>
-          <a:bodyPr/>
-          <a:lstStyle/>
-          <a:p>
-            <a:r>
-              <a:rPr lang="fi-FI"/>
-              <a:t>NTUA G. Bakas, I. Papakrivopoulos</a:t>
-            </a:r>
-            <a:endParaRPr lang="en-US" dirty="0"/>
-          </a:p>
-        </p:txBody>
-      </p:sp>
-      <p:sp>
-        <p:nvSpPr>
-          <p:cNvPr id="7" name="TextBox 6"/>
-          <p:cNvSpPr txBox="1"/>
-          <p:nvPr/>
-        </p:nvSpPr>
-        <p:spPr>
-          <a:xfrm>
-            <a:off x="111965" y="83975"/>
-            <a:ext cx="11783049" cy="1384995"/>
-          </a:xfrm>
-          <a:prstGeom prst="rect">
-            <a:avLst/>
-          </a:prstGeom>
-          <a:noFill/>
-        </p:spPr>
-        <p:txBody>
-          <a:bodyPr wrap="square" rtlCol="0">
-            <a:spAutoFit/>
-          </a:bodyPr>
-          <a:lstStyle/>
-          <a:p>
-            <a:r>
-              <a:rPr lang="en-US" sz="2800" u="sng" dirty="0"/>
-              <a:t>QCD Closure Tests </a:t>
-            </a:r>
-            <a:r>
-              <a:rPr lang="el-GR" sz="2800" u="sng" dirty="0"/>
-              <a:t>’</a:t>
-            </a:r>
-            <a:r>
-              <a:rPr lang="en-US" sz="2800" u="sng" dirty="0"/>
-              <a:t>16</a:t>
-            </a:r>
-            <a:r>
-              <a:rPr lang="el-GR" sz="2800" u="sng" dirty="0"/>
-              <a:t>, ‘17, ’18 </a:t>
-            </a:r>
-            <a:r>
-              <a:rPr lang="en-US" sz="2800" u="sng" dirty="0"/>
-              <a:t>jetPt0</a:t>
-            </a:r>
-          </a:p>
-          <a:p>
-            <a:endParaRPr lang="en-US" sz="2800" u="sng" dirty="0"/>
-          </a:p>
-          <a:p>
-            <a:endParaRPr lang="en-US" sz="2800" u="sng" dirty="0"/>
-          </a:p>
-        </p:txBody>
-      </p:sp>
-      <p:sp>
-        <p:nvSpPr>
-          <p:cNvPr id="14" name="TextBox 13"/>
-          <p:cNvSpPr txBox="1"/>
-          <p:nvPr/>
-        </p:nvSpPr>
-        <p:spPr>
-          <a:xfrm>
-            <a:off x="4546607" y="725254"/>
-            <a:ext cx="3402438" cy="369332"/>
-          </a:xfrm>
-          <a:prstGeom prst="rect">
-            <a:avLst/>
-          </a:prstGeom>
-          <a:noFill/>
-        </p:spPr>
-        <p:txBody>
-          <a:bodyPr wrap="square" rtlCol="0">
-            <a:spAutoFit/>
-          </a:bodyPr>
-          <a:lstStyle/>
-          <a:p>
-            <a:pPr algn="ctr"/>
-            <a:r>
-              <a:rPr lang="en-US" dirty="0" err="1"/>
-              <a:t>jetMassSoftDrop</a:t>
-            </a:r>
-            <a:r>
-              <a:rPr lang="en-US" dirty="0"/>
-              <a:t> (leading jet)</a:t>
-            </a:r>
-            <a:endParaRPr lang="en-GB" dirty="0"/>
-          </a:p>
-        </p:txBody>
-      </p:sp>
-      <p:pic>
-        <p:nvPicPr>
-          <p:cNvPr id="6" name="Picture 5">
-            <a:extLst>
-              <a:ext uri="{FF2B5EF4-FFF2-40B4-BE49-F238E27FC236}">
-                <a16:creationId xmlns:a16="http://schemas.microsoft.com/office/drawing/2014/main" id="{A946705A-AAE2-CF4E-9D74-1E04A92FB8CB}"/>
-              </a:ext>
-            </a:extLst>
-          </p:cNvPr>
-          <p:cNvPicPr>
-            <a:picLocks noChangeAspect="1"/>
-          </p:cNvPicPr>
-          <p:nvPr/>
-        </p:nvPicPr>
-        <p:blipFill>
-          <a:blip r:embed="rId2"/>
-          <a:stretch>
-            <a:fillRect/>
-          </a:stretch>
-        </p:blipFill>
-        <p:spPr>
-          <a:xfrm>
-            <a:off x="14720" y="1838878"/>
-            <a:ext cx="3989070" cy="3280410"/>
-          </a:xfrm>
-          <a:prstGeom prst="rect">
-            <a:avLst/>
-          </a:prstGeom>
-        </p:spPr>
-      </p:pic>
-      <p:pic>
-        <p:nvPicPr>
-          <p:cNvPr id="12" name="Picture 11">
-            <a:extLst>
-              <a:ext uri="{FF2B5EF4-FFF2-40B4-BE49-F238E27FC236}">
-                <a16:creationId xmlns:a16="http://schemas.microsoft.com/office/drawing/2014/main" id="{C6D1C771-49E6-214D-A05E-53C2BA6FF4EF}"/>
-              </a:ext>
-            </a:extLst>
-          </p:cNvPr>
-          <p:cNvPicPr>
-            <a:picLocks noChangeAspect="1"/>
-          </p:cNvPicPr>
-          <p:nvPr/>
-        </p:nvPicPr>
-        <p:blipFill>
-          <a:blip r:embed="rId3"/>
-          <a:stretch>
-            <a:fillRect/>
-          </a:stretch>
-        </p:blipFill>
-        <p:spPr>
-          <a:xfrm>
-            <a:off x="4260650" y="1838878"/>
-            <a:ext cx="3989070" cy="3280410"/>
-          </a:xfrm>
-          <a:prstGeom prst="rect">
-            <a:avLst/>
-          </a:prstGeom>
-        </p:spPr>
-      </p:pic>
-      <p:pic>
-        <p:nvPicPr>
-          <p:cNvPr id="15" name="Picture 14">
-            <a:extLst>
-              <a:ext uri="{FF2B5EF4-FFF2-40B4-BE49-F238E27FC236}">
-                <a16:creationId xmlns:a16="http://schemas.microsoft.com/office/drawing/2014/main" id="{942B0177-56C3-7041-BBCA-BCC58B43A5FE}"/>
-              </a:ext>
-            </a:extLst>
-          </p:cNvPr>
-          <p:cNvPicPr>
-            <a:picLocks noChangeAspect="1"/>
-          </p:cNvPicPr>
-          <p:nvPr/>
-        </p:nvPicPr>
-        <p:blipFill>
-          <a:blip r:embed="rId4"/>
-          <a:stretch>
-            <a:fillRect/>
-          </a:stretch>
-        </p:blipFill>
-        <p:spPr>
-          <a:xfrm>
-            <a:off x="8202930" y="1842081"/>
-            <a:ext cx="3989070" cy="3280410"/>
-          </a:xfrm>
-          <a:prstGeom prst="rect">
-            <a:avLst/>
-          </a:prstGeom>
-        </p:spPr>
-      </p:pic>
-      <p:sp>
-        <p:nvSpPr>
-          <p:cNvPr id="16" name="TextBox 15">
-            <a:extLst>
-              <a:ext uri="{FF2B5EF4-FFF2-40B4-BE49-F238E27FC236}">
-                <a16:creationId xmlns:a16="http://schemas.microsoft.com/office/drawing/2014/main" id="{FAA9EFF5-17B7-CA43-8E41-9C3778861EAF}"/>
-              </a:ext>
-            </a:extLst>
-          </p:cNvPr>
-          <p:cNvSpPr txBox="1"/>
-          <p:nvPr/>
-        </p:nvSpPr>
-        <p:spPr>
-          <a:xfrm>
-            <a:off x="1482436" y="1094586"/>
-            <a:ext cx="1205346" cy="369332"/>
-          </a:xfrm>
-          <a:prstGeom prst="rect">
-            <a:avLst/>
-          </a:prstGeom>
-          <a:noFill/>
-        </p:spPr>
-        <p:txBody>
-          <a:bodyPr wrap="square" rtlCol="0">
-            <a:spAutoFit/>
-          </a:bodyPr>
-          <a:lstStyle/>
-          <a:p>
-            <a:pPr algn="ctr"/>
-            <a:r>
-              <a:rPr lang="en-US" dirty="0"/>
-              <a:t>2016</a:t>
-            </a:r>
-          </a:p>
-        </p:txBody>
-      </p:sp>
-      <p:sp>
-        <p:nvSpPr>
-          <p:cNvPr id="17" name="TextBox 16">
-            <a:extLst>
-              <a:ext uri="{FF2B5EF4-FFF2-40B4-BE49-F238E27FC236}">
-                <a16:creationId xmlns:a16="http://schemas.microsoft.com/office/drawing/2014/main" id="{8D8DD0F4-95B1-6A41-808A-847E17A0BC91}"/>
-              </a:ext>
-            </a:extLst>
-          </p:cNvPr>
-          <p:cNvSpPr txBox="1"/>
-          <p:nvPr/>
-        </p:nvSpPr>
-        <p:spPr>
-          <a:xfrm>
-            <a:off x="5652512" y="1094586"/>
-            <a:ext cx="1205346" cy="369332"/>
-          </a:xfrm>
-          <a:prstGeom prst="rect">
-            <a:avLst/>
-          </a:prstGeom>
-          <a:noFill/>
-        </p:spPr>
-        <p:txBody>
-          <a:bodyPr wrap="square" rtlCol="0">
-            <a:spAutoFit/>
-          </a:bodyPr>
-          <a:lstStyle/>
-          <a:p>
-            <a:pPr algn="ctr"/>
-            <a:r>
-              <a:rPr lang="en-US" dirty="0"/>
-              <a:t>2017</a:t>
-            </a:r>
-          </a:p>
-        </p:txBody>
-      </p:sp>
-      <p:sp>
-        <p:nvSpPr>
-          <p:cNvPr id="18" name="TextBox 17">
-            <a:extLst>
-              <a:ext uri="{FF2B5EF4-FFF2-40B4-BE49-F238E27FC236}">
-                <a16:creationId xmlns:a16="http://schemas.microsoft.com/office/drawing/2014/main" id="{15C89233-ACBD-7248-922A-00C195C93401}"/>
-              </a:ext>
-            </a:extLst>
-          </p:cNvPr>
-          <p:cNvSpPr txBox="1"/>
-          <p:nvPr/>
-        </p:nvSpPr>
-        <p:spPr>
-          <a:xfrm>
-            <a:off x="9594792" y="1094586"/>
-            <a:ext cx="1205346" cy="369332"/>
-          </a:xfrm>
-          <a:prstGeom prst="rect">
-            <a:avLst/>
-          </a:prstGeom>
-          <a:noFill/>
-        </p:spPr>
-        <p:txBody>
-          <a:bodyPr wrap="square" rtlCol="0">
-            <a:spAutoFit/>
-          </a:bodyPr>
-          <a:lstStyle/>
-          <a:p>
-            <a:pPr algn="ctr"/>
-            <a:r>
-              <a:rPr lang="en-US" dirty="0"/>
-              <a:t>2018</a:t>
-            </a:r>
-          </a:p>
-        </p:txBody>
-      </p:sp>
-    </p:spTree>
-    <p:extLst>
-      <p:ext uri="{BB962C8B-B14F-4D97-AF65-F5344CB8AC3E}">
-        <p14:creationId xmlns:p14="http://schemas.microsoft.com/office/powerpoint/2010/main" val="1833211485"/>
-      </p:ext>
-    </p:extLst>
-  </p:cSld>
-  <p:clrMapOvr>
-    <a:masterClrMapping/>
-  </p:clrMapOvr>
-</p:sld>
-</file>
-
-<file path=ppt/slides/slide11.xml><?xml version="1.0" encoding="utf-8"?>
-<p:sld xmlns:a="http://schemas.openxmlformats.org/drawingml/2006/main" xmlns:r="http://schemas.openxmlformats.org/officeDocument/2006/relationships" xmlns:p="http://schemas.openxmlformats.org/presentationml/2006/main">
-  <p:cSld>
-    <p:spTree>
-      <p:nvGrpSpPr>
-        <p:cNvPr id="1" name=""/>
-        <p:cNvGrpSpPr/>
-        <p:nvPr/>
-      </p:nvGrpSpPr>
-      <p:grpSpPr>
-        <a:xfrm>
-          <a:off x="0" y="0"/>
-          <a:ext cx="0" cy="0"/>
-          <a:chOff x="0" y="0"/>
-          <a:chExt cx="0" cy="0"/>
-        </a:xfrm>
-      </p:grpSpPr>
-      <p:sp>
-        <p:nvSpPr>
-          <p:cNvPr id="3" name="Footer Placeholder 2"/>
-          <p:cNvSpPr>
-            <a:spLocks noGrp="1"/>
-          </p:cNvSpPr>
-          <p:nvPr>
-            <p:ph type="ftr" sz="quarter" idx="11"/>
-          </p:nvPr>
-        </p:nvSpPr>
-        <p:spPr/>
-        <p:txBody>
-          <a:bodyPr/>
-          <a:lstStyle/>
-          <a:p>
-            <a:r>
-              <a:rPr lang="fi-FI"/>
-              <a:t>NTUA G. Bakas, I. Papakrivopoulos</a:t>
-            </a:r>
-            <a:endParaRPr lang="en-US" dirty="0"/>
-          </a:p>
-        </p:txBody>
-      </p:sp>
-      <p:sp>
-        <p:nvSpPr>
-          <p:cNvPr id="7" name="TextBox 6"/>
-          <p:cNvSpPr txBox="1"/>
-          <p:nvPr/>
-        </p:nvSpPr>
-        <p:spPr>
-          <a:xfrm>
-            <a:off x="111965" y="83975"/>
-            <a:ext cx="11783049" cy="1384995"/>
-          </a:xfrm>
-          <a:prstGeom prst="rect">
-            <a:avLst/>
-          </a:prstGeom>
-          <a:noFill/>
-        </p:spPr>
-        <p:txBody>
-          <a:bodyPr wrap="square" rtlCol="0">
-            <a:spAutoFit/>
-          </a:bodyPr>
-          <a:lstStyle/>
-          <a:p>
-            <a:r>
-              <a:rPr lang="en-US" sz="2800" u="sng" dirty="0"/>
-              <a:t>QCD Closure Tests </a:t>
-            </a:r>
-            <a:r>
-              <a:rPr lang="el-GR" sz="2800" u="sng" dirty="0"/>
-              <a:t>’</a:t>
-            </a:r>
-            <a:r>
-              <a:rPr lang="en-US" sz="2800" u="sng" dirty="0"/>
-              <a:t>16</a:t>
-            </a:r>
-            <a:r>
-              <a:rPr lang="el-GR" sz="2800" u="sng" dirty="0"/>
-              <a:t>, ‘17, ’18 </a:t>
-            </a:r>
-            <a:r>
-              <a:rPr lang="en-US" sz="2800" u="sng" dirty="0"/>
-              <a:t>jetPt0</a:t>
-            </a:r>
-          </a:p>
-          <a:p>
-            <a:endParaRPr lang="en-US" sz="2800" u="sng" dirty="0"/>
-          </a:p>
-          <a:p>
-            <a:endParaRPr lang="en-US" sz="2800" u="sng" dirty="0"/>
-          </a:p>
-        </p:txBody>
-      </p:sp>
-      <p:sp>
-        <p:nvSpPr>
-          <p:cNvPr id="14" name="TextBox 13"/>
-          <p:cNvSpPr txBox="1"/>
-          <p:nvPr/>
-        </p:nvSpPr>
-        <p:spPr>
-          <a:xfrm>
-            <a:off x="4546607" y="725254"/>
-            <a:ext cx="3402438" cy="369332"/>
-          </a:xfrm>
-          <a:prstGeom prst="rect">
-            <a:avLst/>
-          </a:prstGeom>
-          <a:noFill/>
-        </p:spPr>
-        <p:txBody>
-          <a:bodyPr wrap="square" rtlCol="0">
-            <a:spAutoFit/>
-          </a:bodyPr>
-          <a:lstStyle/>
-          <a:p>
-            <a:pPr algn="ctr"/>
-            <a:r>
-              <a:rPr lang="en-US" dirty="0" err="1"/>
-              <a:t>jetMassSoftDrop</a:t>
-            </a:r>
-            <a:r>
-              <a:rPr lang="en-US" dirty="0"/>
-              <a:t> (leading jet)</a:t>
-            </a:r>
-            <a:endParaRPr lang="en-GB" dirty="0"/>
-          </a:p>
-        </p:txBody>
-      </p:sp>
-      <p:pic>
-        <p:nvPicPr>
-          <p:cNvPr id="8" name="Picture 7">
-            <a:extLst>
-              <a:ext uri="{FF2B5EF4-FFF2-40B4-BE49-F238E27FC236}">
-                <a16:creationId xmlns:a16="http://schemas.microsoft.com/office/drawing/2014/main" id="{D08341BF-C621-A64F-9DF9-168C284B4FA8}"/>
-              </a:ext>
-            </a:extLst>
-          </p:cNvPr>
-          <p:cNvPicPr>
-            <a:picLocks noChangeAspect="1"/>
-          </p:cNvPicPr>
-          <p:nvPr/>
-        </p:nvPicPr>
-        <p:blipFill>
-          <a:blip r:embed="rId2"/>
-          <a:stretch>
-            <a:fillRect/>
-          </a:stretch>
-        </p:blipFill>
-        <p:spPr>
-          <a:xfrm>
-            <a:off x="19884" y="1828229"/>
-            <a:ext cx="3989070" cy="3280410"/>
-          </a:xfrm>
-          <a:prstGeom prst="rect">
-            <a:avLst/>
-          </a:prstGeom>
-        </p:spPr>
-      </p:pic>
-      <p:pic>
-        <p:nvPicPr>
-          <p:cNvPr id="4" name="Picture 3">
-            <a:extLst>
-              <a:ext uri="{FF2B5EF4-FFF2-40B4-BE49-F238E27FC236}">
-                <a16:creationId xmlns:a16="http://schemas.microsoft.com/office/drawing/2014/main" id="{3373AF59-4784-2C46-85A4-53BAC3726F84}"/>
-              </a:ext>
-            </a:extLst>
-          </p:cNvPr>
-          <p:cNvPicPr>
-            <a:picLocks noChangeAspect="1"/>
-          </p:cNvPicPr>
-          <p:nvPr/>
-        </p:nvPicPr>
-        <p:blipFill>
-          <a:blip r:embed="rId3"/>
-          <a:stretch>
-            <a:fillRect/>
-          </a:stretch>
-        </p:blipFill>
-        <p:spPr>
-          <a:xfrm>
-            <a:off x="4008954" y="1828229"/>
-            <a:ext cx="3989070" cy="3280410"/>
-          </a:xfrm>
-          <a:prstGeom prst="rect">
-            <a:avLst/>
-          </a:prstGeom>
-        </p:spPr>
-      </p:pic>
-      <p:pic>
-        <p:nvPicPr>
-          <p:cNvPr id="9" name="Picture 8">
-            <a:extLst>
-              <a:ext uri="{FF2B5EF4-FFF2-40B4-BE49-F238E27FC236}">
-                <a16:creationId xmlns:a16="http://schemas.microsoft.com/office/drawing/2014/main" id="{09AFF309-DB08-984A-B15B-EC669F3DE240}"/>
-              </a:ext>
-            </a:extLst>
-          </p:cNvPr>
-          <p:cNvPicPr>
-            <a:picLocks noChangeAspect="1"/>
-          </p:cNvPicPr>
-          <p:nvPr/>
-        </p:nvPicPr>
-        <p:blipFill>
-          <a:blip r:embed="rId4"/>
-          <a:stretch>
-            <a:fillRect/>
-          </a:stretch>
-        </p:blipFill>
-        <p:spPr>
-          <a:xfrm>
-            <a:off x="8088623" y="1828229"/>
-            <a:ext cx="3989070" cy="3280410"/>
-          </a:xfrm>
-          <a:prstGeom prst="rect">
-            <a:avLst/>
-          </a:prstGeom>
-        </p:spPr>
-      </p:pic>
-      <p:sp>
-        <p:nvSpPr>
-          <p:cNvPr id="11" name="TextBox 10">
-            <a:extLst>
-              <a:ext uri="{FF2B5EF4-FFF2-40B4-BE49-F238E27FC236}">
-                <a16:creationId xmlns:a16="http://schemas.microsoft.com/office/drawing/2014/main" id="{546EF914-039A-E04C-AE2A-AD81D32EF16A}"/>
-              </a:ext>
-            </a:extLst>
-          </p:cNvPr>
-          <p:cNvSpPr txBox="1"/>
-          <p:nvPr/>
-        </p:nvSpPr>
-        <p:spPr>
-          <a:xfrm>
-            <a:off x="1482436" y="1094586"/>
-            <a:ext cx="1205346" cy="369332"/>
-          </a:xfrm>
-          <a:prstGeom prst="rect">
-            <a:avLst/>
-          </a:prstGeom>
-          <a:noFill/>
-        </p:spPr>
-        <p:txBody>
-          <a:bodyPr wrap="square" rtlCol="0">
-            <a:spAutoFit/>
-          </a:bodyPr>
-          <a:lstStyle/>
-          <a:p>
-            <a:pPr algn="ctr"/>
-            <a:r>
-              <a:rPr lang="en-US" dirty="0"/>
-              <a:t>2016</a:t>
-            </a:r>
-          </a:p>
-        </p:txBody>
-      </p:sp>
-      <p:sp>
-        <p:nvSpPr>
-          <p:cNvPr id="12" name="TextBox 11">
-            <a:extLst>
-              <a:ext uri="{FF2B5EF4-FFF2-40B4-BE49-F238E27FC236}">
-                <a16:creationId xmlns:a16="http://schemas.microsoft.com/office/drawing/2014/main" id="{9465D3B6-9369-324C-9DB0-2734BAF9EF3E}"/>
-              </a:ext>
-            </a:extLst>
-          </p:cNvPr>
-          <p:cNvSpPr txBox="1"/>
-          <p:nvPr/>
-        </p:nvSpPr>
-        <p:spPr>
-          <a:xfrm>
-            <a:off x="5652512" y="1094586"/>
-            <a:ext cx="1205346" cy="369332"/>
-          </a:xfrm>
-          <a:prstGeom prst="rect">
-            <a:avLst/>
-          </a:prstGeom>
-          <a:noFill/>
-        </p:spPr>
-        <p:txBody>
-          <a:bodyPr wrap="square" rtlCol="0">
-            <a:spAutoFit/>
-          </a:bodyPr>
-          <a:lstStyle/>
-          <a:p>
-            <a:pPr algn="ctr"/>
-            <a:r>
-              <a:rPr lang="en-US" dirty="0"/>
-              <a:t>2017</a:t>
-            </a:r>
-          </a:p>
-        </p:txBody>
-      </p:sp>
-      <p:sp>
-        <p:nvSpPr>
-          <p:cNvPr id="13" name="TextBox 12">
-            <a:extLst>
-              <a:ext uri="{FF2B5EF4-FFF2-40B4-BE49-F238E27FC236}">
-                <a16:creationId xmlns:a16="http://schemas.microsoft.com/office/drawing/2014/main" id="{4485BDAB-8259-E54A-A645-B6B9214E195F}"/>
-              </a:ext>
-            </a:extLst>
-          </p:cNvPr>
-          <p:cNvSpPr txBox="1"/>
-          <p:nvPr/>
-        </p:nvSpPr>
-        <p:spPr>
-          <a:xfrm>
-            <a:off x="9504218" y="1094586"/>
-            <a:ext cx="1205346" cy="369332"/>
-          </a:xfrm>
-          <a:prstGeom prst="rect">
-            <a:avLst/>
-          </a:prstGeom>
-          <a:noFill/>
-        </p:spPr>
-        <p:txBody>
-          <a:bodyPr wrap="square" rtlCol="0">
-            <a:spAutoFit/>
-          </a:bodyPr>
-          <a:lstStyle/>
-          <a:p>
-            <a:pPr algn="ctr"/>
-            <a:r>
-              <a:rPr lang="en-US" dirty="0"/>
-              <a:t>2018</a:t>
-            </a:r>
-          </a:p>
-        </p:txBody>
-      </p:sp>
-    </p:spTree>
-    <p:extLst>
-      <p:ext uri="{BB962C8B-B14F-4D97-AF65-F5344CB8AC3E}">
-        <p14:creationId xmlns:p14="http://schemas.microsoft.com/office/powerpoint/2010/main" val="2079852111"/>
-      </p:ext>
-    </p:extLst>
-  </p:cSld>
-  <p:clrMapOvr>
-    <a:masterClrMapping/>
-  </p:clrMapOvr>
-</p:sld>
-</file>
-
 <file path=ppt/slides/slide2.xml><?xml version="1.0" encoding="utf-8"?>
 <p:sld xmlns:a="http://schemas.openxmlformats.org/drawingml/2006/main" xmlns:r="http://schemas.openxmlformats.org/officeDocument/2006/relationships" xmlns:p="http://schemas.openxmlformats.org/presentationml/2006/main">
   <p:cSld>
@@ -9607,96 +8931,6 @@
           </a:p>
         </p:txBody>
       </p:sp>
-      <p:pic>
-        <p:nvPicPr>
-          <p:cNvPr id="2" name="Picture 1"/>
-          <p:cNvPicPr>
-            <a:picLocks noChangeAspect="1"/>
-          </p:cNvPicPr>
-          <p:nvPr/>
-        </p:nvPicPr>
-        <p:blipFill>
-          <a:blip r:embed="rId2">
-            <a:extLst>
-              <a:ext uri="{28A0092B-C50C-407E-A947-70E740481C1C}">
-                <a14:useLocalDpi xmlns:a14="http://schemas.microsoft.com/office/drawing/2010/main" val="0"/>
-              </a:ext>
-            </a:extLst>
-          </a:blip>
-          <a:stretch>
-            <a:fillRect/>
-          </a:stretch>
-        </p:blipFill>
-        <p:spPr>
-          <a:xfrm>
-            <a:off x="0" y="1516370"/>
-            <a:ext cx="4251814" cy="3363058"/>
-          </a:xfrm>
-          <a:prstGeom prst="rect">
-            <a:avLst/>
-          </a:prstGeom>
-        </p:spPr>
-      </p:pic>
-      <p:pic>
-        <p:nvPicPr>
-          <p:cNvPr id="4" name="Picture 3"/>
-          <p:cNvPicPr>
-            <a:picLocks noChangeAspect="1"/>
-          </p:cNvPicPr>
-          <p:nvPr/>
-        </p:nvPicPr>
-        <p:blipFill>
-          <a:blip r:embed="rId3">
-            <a:extLst>
-              <a:ext uri="{28A0092B-C50C-407E-A947-70E740481C1C}">
-                <a14:useLocalDpi xmlns:a14="http://schemas.microsoft.com/office/drawing/2010/main" val="0"/>
-              </a:ext>
-            </a:extLst>
-          </a:blip>
-          <a:stretch>
-            <a:fillRect/>
-          </a:stretch>
-        </p:blipFill>
-        <p:spPr>
-          <a:xfrm>
-            <a:off x="3933125" y="1516370"/>
-            <a:ext cx="4251816" cy="3363058"/>
-          </a:xfrm>
-          <a:prstGeom prst="rect">
-            <a:avLst/>
-          </a:prstGeom>
-        </p:spPr>
-      </p:pic>
-      <p:pic>
-        <p:nvPicPr>
-          <p:cNvPr id="9" name="Picture 8"/>
-          <p:cNvPicPr>
-            <a:picLocks noChangeAspect="1"/>
-          </p:cNvPicPr>
-          <p:nvPr/>
-        </p:nvPicPr>
-        <p:blipFill>
-          <a:blip r:embed="rId4">
-            <a:extLst>
-              <a:ext uri="{28A0092B-C50C-407E-A947-70E740481C1C}">
-                <a14:useLocalDpi xmlns:a14="http://schemas.microsoft.com/office/drawing/2010/main" val="0"/>
-              </a:ext>
-            </a:extLst>
-          </a:blip>
-          <a:stretch>
-            <a:fillRect/>
-          </a:stretch>
-        </p:blipFill>
-        <p:spPr>
-          <a:xfrm>
-            <a:off x="7940184" y="1516370"/>
-            <a:ext cx="4251816" cy="3363058"/>
-          </a:xfrm>
-          <a:prstGeom prst="rect">
-            <a:avLst/>
-          </a:prstGeom>
-        </p:spPr>
-      </p:pic>
     </p:spTree>
     <p:extLst>
       <p:ext uri="{BB962C8B-B14F-4D97-AF65-F5344CB8AC3E}">
@@ -9840,96 +9074,6 @@
           </a:p>
         </p:txBody>
       </p:sp>
-      <p:pic>
-        <p:nvPicPr>
-          <p:cNvPr id="5" name="Picture 4"/>
-          <p:cNvPicPr>
-            <a:picLocks noChangeAspect="1"/>
-          </p:cNvPicPr>
-          <p:nvPr/>
-        </p:nvPicPr>
-        <p:blipFill>
-          <a:blip r:embed="rId2">
-            <a:extLst>
-              <a:ext uri="{28A0092B-C50C-407E-A947-70E740481C1C}">
-                <a14:useLocalDpi xmlns:a14="http://schemas.microsoft.com/office/drawing/2010/main" val="0"/>
-              </a:ext>
-            </a:extLst>
-          </a:blip>
-          <a:stretch>
-            <a:fillRect/>
-          </a:stretch>
-        </p:blipFill>
-        <p:spPr>
-          <a:xfrm>
-            <a:off x="0" y="1532512"/>
-            <a:ext cx="4233242" cy="3348367"/>
-          </a:xfrm>
-          <a:prstGeom prst="rect">
-            <a:avLst/>
-          </a:prstGeom>
-        </p:spPr>
-      </p:pic>
-      <p:pic>
-        <p:nvPicPr>
-          <p:cNvPr id="6" name="Picture 5"/>
-          <p:cNvPicPr>
-            <a:picLocks noChangeAspect="1"/>
-          </p:cNvPicPr>
-          <p:nvPr/>
-        </p:nvPicPr>
-        <p:blipFill>
-          <a:blip r:embed="rId3">
-            <a:extLst>
-              <a:ext uri="{28A0092B-C50C-407E-A947-70E740481C1C}">
-                <a14:useLocalDpi xmlns:a14="http://schemas.microsoft.com/office/drawing/2010/main" val="0"/>
-              </a:ext>
-            </a:extLst>
-          </a:blip>
-          <a:stretch>
-            <a:fillRect/>
-          </a:stretch>
-        </p:blipFill>
-        <p:spPr>
-          <a:xfrm>
-            <a:off x="3941297" y="1516370"/>
-            <a:ext cx="4253651" cy="3364510"/>
-          </a:xfrm>
-          <a:prstGeom prst="rect">
-            <a:avLst/>
-          </a:prstGeom>
-        </p:spPr>
-      </p:pic>
-      <p:pic>
-        <p:nvPicPr>
-          <p:cNvPr id="8" name="Picture 7"/>
-          <p:cNvPicPr>
-            <a:picLocks noChangeAspect="1"/>
-          </p:cNvPicPr>
-          <p:nvPr/>
-        </p:nvPicPr>
-        <p:blipFill>
-          <a:blip r:embed="rId4">
-            <a:extLst>
-              <a:ext uri="{28A0092B-C50C-407E-A947-70E740481C1C}">
-                <a14:useLocalDpi xmlns:a14="http://schemas.microsoft.com/office/drawing/2010/main" val="0"/>
-              </a:ext>
-            </a:extLst>
-          </a:blip>
-          <a:stretch>
-            <a:fillRect/>
-          </a:stretch>
-        </p:blipFill>
-        <p:spPr>
-          <a:xfrm>
-            <a:off x="7926296" y="1513071"/>
-            <a:ext cx="4257821" cy="3367808"/>
-          </a:xfrm>
-          <a:prstGeom prst="rect">
-            <a:avLst/>
-          </a:prstGeom>
-        </p:spPr>
-      </p:pic>
     </p:spTree>
     <p:extLst>
       <p:ext uri="{BB962C8B-B14F-4D97-AF65-F5344CB8AC3E}">
@@ -10073,126 +9217,6 @@
           </a:p>
         </p:txBody>
       </p:sp>
-      <p:pic>
-        <p:nvPicPr>
-          <p:cNvPr id="2" name="Picture 1"/>
-          <p:cNvPicPr>
-            <a:picLocks noChangeAspect="1"/>
-          </p:cNvPicPr>
-          <p:nvPr/>
-        </p:nvPicPr>
-        <p:blipFill>
-          <a:blip r:embed="rId2">
-            <a:extLst>
-              <a:ext uri="{28A0092B-C50C-407E-A947-70E740481C1C}">
-                <a14:useLocalDpi xmlns:a14="http://schemas.microsoft.com/office/drawing/2010/main" val="0"/>
-              </a:ext>
-            </a:extLst>
-          </a:blip>
-          <a:stretch>
-            <a:fillRect/>
-          </a:stretch>
-        </p:blipFill>
-        <p:spPr>
-          <a:xfrm>
-            <a:off x="1" y="1532135"/>
-            <a:ext cx="4233242" cy="3348367"/>
-          </a:xfrm>
-          <a:prstGeom prst="rect">
-            <a:avLst/>
-          </a:prstGeom>
-        </p:spPr>
-      </p:pic>
-      <p:pic>
-        <p:nvPicPr>
-          <p:cNvPr id="4" name="Picture 3"/>
-          <p:cNvPicPr>
-            <a:picLocks noChangeAspect="1"/>
-          </p:cNvPicPr>
-          <p:nvPr/>
-        </p:nvPicPr>
-        <p:blipFill>
-          <a:blip r:embed="rId3">
-            <a:extLst>
-              <a:ext uri="{28A0092B-C50C-407E-A947-70E740481C1C}">
-                <a14:useLocalDpi xmlns:a14="http://schemas.microsoft.com/office/drawing/2010/main" val="0"/>
-              </a:ext>
-            </a:extLst>
-          </a:blip>
-          <a:stretch>
-            <a:fillRect/>
-          </a:stretch>
-        </p:blipFill>
-        <p:spPr>
-          <a:xfrm>
-            <a:off x="3960966" y="1524253"/>
-            <a:ext cx="4253651" cy="3364510"/>
-          </a:xfrm>
-          <a:prstGeom prst="rect">
-            <a:avLst/>
-          </a:prstGeom>
-        </p:spPr>
-      </p:pic>
-      <p:pic>
-        <p:nvPicPr>
-          <p:cNvPr id="11" name="Picture 10"/>
-          <p:cNvPicPr>
-            <a:picLocks noChangeAspect="1"/>
-          </p:cNvPicPr>
-          <p:nvPr/>
-        </p:nvPicPr>
-        <p:blipFill>
-          <a:blip r:embed="rId3">
-            <a:extLst>
-              <a:ext uri="{28A0092B-C50C-407E-A947-70E740481C1C}">
-                <a14:useLocalDpi xmlns:a14="http://schemas.microsoft.com/office/drawing/2010/main" val="0"/>
-              </a:ext>
-            </a:extLst>
-          </a:blip>
-          <a:stretch>
-            <a:fillRect/>
-          </a:stretch>
-        </p:blipFill>
-        <p:spPr>
-          <a:xfrm>
-            <a:off x="3960967" y="1532135"/>
-            <a:ext cx="4233242" cy="3348367"/>
-          </a:xfrm>
-          <a:prstGeom prst="rect">
-            <a:avLst/>
-          </a:prstGeom>
-        </p:spPr>
-      </p:pic>
-      <p:pic>
-        <p:nvPicPr>
-          <p:cNvPr id="9" name="Picture 8"/>
-          <p:cNvPicPr>
-            <a:picLocks noChangeAspect="1"/>
-          </p:cNvPicPr>
-          <p:nvPr/>
-        </p:nvPicPr>
-        <p:blipFill>
-          <a:blip r:embed="rId4">
-            <a:extLst>
-              <a:ext uri="{28A0092B-C50C-407E-A947-70E740481C1C}">
-                <a14:useLocalDpi xmlns:a14="http://schemas.microsoft.com/office/drawing/2010/main" val="0"/>
-              </a:ext>
-            </a:extLst>
-          </a:blip>
-          <a:stretch>
-            <a:fillRect/>
-          </a:stretch>
-        </p:blipFill>
-        <p:spPr>
-          <a:xfrm>
-            <a:off x="7948313" y="1523874"/>
-            <a:ext cx="4243687" cy="3356628"/>
-          </a:xfrm>
-          <a:prstGeom prst="rect">
-            <a:avLst/>
-          </a:prstGeom>
-        </p:spPr>
-      </p:pic>
     </p:spTree>
     <p:extLst>
       <p:ext uri="{BB962C8B-B14F-4D97-AF65-F5344CB8AC3E}">
@@ -10306,7 +9330,7 @@
         <p:spPr>
           <a:xfrm>
             <a:off x="4546607" y="725254"/>
-            <a:ext cx="2913763" cy="369332"/>
+            <a:ext cx="3402438" cy="369332"/>
           </a:xfrm>
           <a:prstGeom prst="rect">
             <a:avLst/>
@@ -10322,15 +9346,11 @@
             <a:pPr algn="ctr"/>
             <a:r>
               <a:rPr lang="en-US" dirty="0" err="1"/>
-              <a:t>topTagger</a:t>
+              <a:t>jetMassSoftDrop</a:t>
             </a:r>
             <a:r>
               <a:rPr lang="en-US" dirty="0"/>
-              <a:t> 0.2, </a:t>
-            </a:r>
-            <a:r>
-              <a:rPr lang="en-US" dirty="0" err="1"/>
-              <a:t>deepCSV</a:t>
+              <a:t> (leading jet)</a:t>
             </a:r>
             <a:endParaRPr lang="en-GB" dirty="0"/>
           </a:p>
@@ -10338,28 +9358,28 @@
       </p:sp>
       <p:pic>
         <p:nvPicPr>
-          <p:cNvPr id="5" name="Picture 4"/>
+          <p:cNvPr id="6" name="Picture 5">
+            <a:extLst>
+              <a:ext uri="{FF2B5EF4-FFF2-40B4-BE49-F238E27FC236}">
+                <a16:creationId xmlns:a16="http://schemas.microsoft.com/office/drawing/2014/main" id="{A946705A-AAE2-CF4E-9D74-1E04A92FB8CB}"/>
+              </a:ext>
+            </a:extLst>
+          </p:cNvPr>
           <p:cNvPicPr>
             <a:picLocks noChangeAspect="1"/>
           </p:cNvPicPr>
           <p:nvPr/>
         </p:nvPicPr>
         <p:blipFill>
-          <a:blip r:embed="rId2">
-            <a:extLst>
-              <a:ext uri="{28A0092B-C50C-407E-A947-70E740481C1C}">
-                <a14:useLocalDpi xmlns:a14="http://schemas.microsoft.com/office/drawing/2010/main" val="0"/>
-              </a:ext>
-            </a:extLst>
-          </a:blip>
+          <a:blip r:embed="rId2"/>
           <a:stretch>
             <a:fillRect/>
           </a:stretch>
         </p:blipFill>
         <p:spPr>
           <a:xfrm>
-            <a:off x="-3263" y="1530370"/>
-            <a:ext cx="4235473" cy="3350132"/>
+            <a:off x="14720" y="1838878"/>
+            <a:ext cx="3989070" cy="3280410"/>
           </a:xfrm>
           <a:prstGeom prst="rect">
             <a:avLst/>
@@ -10368,28 +9388,28 @@
       </p:pic>
       <p:pic>
         <p:nvPicPr>
-          <p:cNvPr id="6" name="Picture 5"/>
+          <p:cNvPr id="12" name="Picture 11">
+            <a:extLst>
+              <a:ext uri="{FF2B5EF4-FFF2-40B4-BE49-F238E27FC236}">
+                <a16:creationId xmlns:a16="http://schemas.microsoft.com/office/drawing/2014/main" id="{C6D1C771-49E6-214D-A05E-53C2BA6FF4EF}"/>
+              </a:ext>
+            </a:extLst>
+          </p:cNvPr>
           <p:cNvPicPr>
             <a:picLocks noChangeAspect="1"/>
           </p:cNvPicPr>
           <p:nvPr/>
         </p:nvPicPr>
         <p:blipFill>
-          <a:blip r:embed="rId3">
-            <a:extLst>
-              <a:ext uri="{28A0092B-C50C-407E-A947-70E740481C1C}">
-                <a14:useLocalDpi xmlns:a14="http://schemas.microsoft.com/office/drawing/2010/main" val="0"/>
-              </a:ext>
-            </a:extLst>
-          </a:blip>
+          <a:blip r:embed="rId3"/>
           <a:stretch>
             <a:fillRect/>
           </a:stretch>
         </p:blipFill>
         <p:spPr>
           <a:xfrm>
-            <a:off x="3908858" y="1530370"/>
-            <a:ext cx="4235474" cy="3350132"/>
+            <a:off x="4260650" y="1838878"/>
+            <a:ext cx="3989070" cy="3280410"/>
           </a:xfrm>
           <a:prstGeom prst="rect">
             <a:avLst/>
@@ -10398,38 +9418,146 @@
       </p:pic>
       <p:pic>
         <p:nvPicPr>
-          <p:cNvPr id="8" name="Picture 7"/>
+          <p:cNvPr id="15" name="Picture 14">
+            <a:extLst>
+              <a:ext uri="{FF2B5EF4-FFF2-40B4-BE49-F238E27FC236}">
+                <a16:creationId xmlns:a16="http://schemas.microsoft.com/office/drawing/2014/main" id="{942B0177-56C3-7041-BBCA-BCC58B43A5FE}"/>
+              </a:ext>
+            </a:extLst>
+          </p:cNvPr>
           <p:cNvPicPr>
             <a:picLocks noChangeAspect="1"/>
           </p:cNvPicPr>
           <p:nvPr/>
         </p:nvPicPr>
         <p:blipFill>
-          <a:blip r:embed="rId4">
-            <a:extLst>
-              <a:ext uri="{28A0092B-C50C-407E-A947-70E740481C1C}">
-                <a14:useLocalDpi xmlns:a14="http://schemas.microsoft.com/office/drawing/2010/main" val="0"/>
-              </a:ext>
-            </a:extLst>
-          </a:blip>
+          <a:blip r:embed="rId4"/>
           <a:stretch>
             <a:fillRect/>
           </a:stretch>
         </p:blipFill>
         <p:spPr>
           <a:xfrm>
-            <a:off x="7878900" y="1530370"/>
-            <a:ext cx="4235474" cy="3350132"/>
+            <a:off x="8202930" y="1842081"/>
+            <a:ext cx="3989070" cy="3280410"/>
           </a:xfrm>
           <a:prstGeom prst="rect">
             <a:avLst/>
           </a:prstGeom>
         </p:spPr>
       </p:pic>
+      <p:sp>
+        <p:nvSpPr>
+          <p:cNvPr id="16" name="TextBox 15">
+            <a:extLst>
+              <a:ext uri="{FF2B5EF4-FFF2-40B4-BE49-F238E27FC236}">
+                <a16:creationId xmlns:a16="http://schemas.microsoft.com/office/drawing/2014/main" id="{FAA9EFF5-17B7-CA43-8E41-9C3778861EAF}"/>
+              </a:ext>
+            </a:extLst>
+          </p:cNvPr>
+          <p:cNvSpPr txBox="1"/>
+          <p:nvPr/>
+        </p:nvSpPr>
+        <p:spPr>
+          <a:xfrm>
+            <a:off x="1482436" y="1094586"/>
+            <a:ext cx="1205346" cy="369332"/>
+          </a:xfrm>
+          <a:prstGeom prst="rect">
+            <a:avLst/>
+          </a:prstGeom>
+          <a:noFill/>
+        </p:spPr>
+        <p:txBody>
+          <a:bodyPr wrap="square" rtlCol="0">
+            <a:spAutoFit/>
+          </a:bodyPr>
+          <a:lstStyle/>
+          <a:p>
+            <a:pPr algn="ctr"/>
+            <a:r>
+              <a:rPr lang="en-US" dirty="0"/>
+              <a:t>2016</a:t>
+            </a:r>
+          </a:p>
+        </p:txBody>
+      </p:sp>
+      <p:sp>
+        <p:nvSpPr>
+          <p:cNvPr id="17" name="TextBox 16">
+            <a:extLst>
+              <a:ext uri="{FF2B5EF4-FFF2-40B4-BE49-F238E27FC236}">
+                <a16:creationId xmlns:a16="http://schemas.microsoft.com/office/drawing/2014/main" id="{8D8DD0F4-95B1-6A41-808A-847E17A0BC91}"/>
+              </a:ext>
+            </a:extLst>
+          </p:cNvPr>
+          <p:cNvSpPr txBox="1"/>
+          <p:nvPr/>
+        </p:nvSpPr>
+        <p:spPr>
+          <a:xfrm>
+            <a:off x="5652512" y="1094586"/>
+            <a:ext cx="1205346" cy="369332"/>
+          </a:xfrm>
+          <a:prstGeom prst="rect">
+            <a:avLst/>
+          </a:prstGeom>
+          <a:noFill/>
+        </p:spPr>
+        <p:txBody>
+          <a:bodyPr wrap="square" rtlCol="0">
+            <a:spAutoFit/>
+          </a:bodyPr>
+          <a:lstStyle/>
+          <a:p>
+            <a:pPr algn="ctr"/>
+            <a:r>
+              <a:rPr lang="en-US" dirty="0"/>
+              <a:t>2017</a:t>
+            </a:r>
+          </a:p>
+        </p:txBody>
+      </p:sp>
+      <p:sp>
+        <p:nvSpPr>
+          <p:cNvPr id="18" name="TextBox 17">
+            <a:extLst>
+              <a:ext uri="{FF2B5EF4-FFF2-40B4-BE49-F238E27FC236}">
+                <a16:creationId xmlns:a16="http://schemas.microsoft.com/office/drawing/2014/main" id="{15C89233-ACBD-7248-922A-00C195C93401}"/>
+              </a:ext>
+            </a:extLst>
+          </p:cNvPr>
+          <p:cNvSpPr txBox="1"/>
+          <p:nvPr/>
+        </p:nvSpPr>
+        <p:spPr>
+          <a:xfrm>
+            <a:off x="9594792" y="1094586"/>
+            <a:ext cx="1205346" cy="369332"/>
+          </a:xfrm>
+          <a:prstGeom prst="rect">
+            <a:avLst/>
+          </a:prstGeom>
+          <a:noFill/>
+        </p:spPr>
+        <p:txBody>
+          <a:bodyPr wrap="square" rtlCol="0">
+            <a:spAutoFit/>
+          </a:bodyPr>
+          <a:lstStyle/>
+          <a:p>
+            <a:pPr algn="ctr"/>
+            <a:r>
+              <a:rPr lang="en-US" dirty="0"/>
+              <a:t>2018</a:t>
+            </a:r>
+          </a:p>
+        </p:txBody>
+      </p:sp>
     </p:spTree>
     <p:extLst>
       <p:ext uri="{BB962C8B-B14F-4D97-AF65-F5344CB8AC3E}">
-        <p14:creationId xmlns:p14="http://schemas.microsoft.com/office/powerpoint/2010/main" val="2869093056"/>
+        <p14:creationId xmlns:p14="http://schemas.microsoft.com/office/powerpoint/2010/main" val="1833211485"/>
       </p:ext>
     </p:extLst>
   </p:cSld>
@@ -10539,7 +9667,7 @@
         <p:spPr>
           <a:xfrm>
             <a:off x="4546607" y="725254"/>
-            <a:ext cx="2913763" cy="369332"/>
+            <a:ext cx="3402438" cy="369332"/>
           </a:xfrm>
           <a:prstGeom prst="rect">
             <a:avLst/>
@@ -10555,15 +9683,11 @@
             <a:pPr algn="ctr"/>
             <a:r>
               <a:rPr lang="en-US" dirty="0" err="1"/>
-              <a:t>topTagger</a:t>
+              <a:t>jetMassSoftDrop</a:t>
             </a:r>
             <a:r>
               <a:rPr lang="en-US" dirty="0"/>
-              <a:t> 0.3, </a:t>
-            </a:r>
-            <a:r>
-              <a:rPr lang="en-US" dirty="0" err="1"/>
-              <a:t>deepCSV</a:t>
+              <a:t> (leading jet)</a:t>
             </a:r>
             <a:endParaRPr lang="en-GB" dirty="0"/>
           </a:p>
@@ -10571,28 +9695,28 @@
       </p:sp>
       <p:pic>
         <p:nvPicPr>
-          <p:cNvPr id="2" name="Picture 1"/>
+          <p:cNvPr id="8" name="Picture 7">
+            <a:extLst>
+              <a:ext uri="{FF2B5EF4-FFF2-40B4-BE49-F238E27FC236}">
+                <a16:creationId xmlns:a16="http://schemas.microsoft.com/office/drawing/2014/main" id="{D08341BF-C621-A64F-9DF9-168C284B4FA8}"/>
+              </a:ext>
+            </a:extLst>
+          </p:cNvPr>
           <p:cNvPicPr>
             <a:picLocks noChangeAspect="1"/>
           </p:cNvPicPr>
           <p:nvPr/>
         </p:nvPicPr>
         <p:blipFill>
-          <a:blip r:embed="rId2">
-            <a:extLst>
-              <a:ext uri="{28A0092B-C50C-407E-A947-70E740481C1C}">
-                <a14:useLocalDpi xmlns:a14="http://schemas.microsoft.com/office/drawing/2010/main" val="0"/>
-              </a:ext>
-            </a:extLst>
-          </a:blip>
+          <a:blip r:embed="rId2"/>
           <a:stretch>
             <a:fillRect/>
           </a:stretch>
         </p:blipFill>
         <p:spPr>
           <a:xfrm>
-            <a:off x="0" y="1468970"/>
-            <a:ext cx="4212082" cy="3331630"/>
+            <a:off x="19884" y="1828229"/>
+            <a:ext cx="3989070" cy="3280410"/>
           </a:xfrm>
           <a:prstGeom prst="rect">
             <a:avLst/>
@@ -10601,28 +9725,28 @@
       </p:pic>
       <p:pic>
         <p:nvPicPr>
-          <p:cNvPr id="4" name="Picture 3"/>
+          <p:cNvPr id="4" name="Picture 3">
+            <a:extLst>
+              <a:ext uri="{FF2B5EF4-FFF2-40B4-BE49-F238E27FC236}">
+                <a16:creationId xmlns:a16="http://schemas.microsoft.com/office/drawing/2014/main" id="{3373AF59-4784-2C46-85A4-53BAC3726F84}"/>
+              </a:ext>
+            </a:extLst>
+          </p:cNvPr>
           <p:cNvPicPr>
             <a:picLocks noChangeAspect="1"/>
           </p:cNvPicPr>
           <p:nvPr/>
         </p:nvPicPr>
         <p:blipFill>
-          <a:blip r:embed="rId3">
-            <a:extLst>
-              <a:ext uri="{28A0092B-C50C-407E-A947-70E740481C1C}">
-                <a14:useLocalDpi xmlns:a14="http://schemas.microsoft.com/office/drawing/2010/main" val="0"/>
-              </a:ext>
-            </a:extLst>
-          </a:blip>
+          <a:blip r:embed="rId3"/>
           <a:stretch>
             <a:fillRect/>
           </a:stretch>
         </p:blipFill>
         <p:spPr>
           <a:xfrm>
-            <a:off x="3991546" y="1468970"/>
-            <a:ext cx="4212082" cy="3331630"/>
+            <a:off x="4008954" y="1828229"/>
+            <a:ext cx="3989070" cy="3280410"/>
           </a:xfrm>
           <a:prstGeom prst="rect">
             <a:avLst/>
@@ -10631,38 +9755,146 @@
       </p:pic>
       <p:pic>
         <p:nvPicPr>
-          <p:cNvPr id="9" name="Picture 8"/>
+          <p:cNvPr id="9" name="Picture 8">
+            <a:extLst>
+              <a:ext uri="{FF2B5EF4-FFF2-40B4-BE49-F238E27FC236}">
+                <a16:creationId xmlns:a16="http://schemas.microsoft.com/office/drawing/2014/main" id="{09AFF309-DB08-984A-B15B-EC669F3DE240}"/>
+              </a:ext>
+            </a:extLst>
+          </p:cNvPr>
           <p:cNvPicPr>
             <a:picLocks noChangeAspect="1"/>
           </p:cNvPicPr>
           <p:nvPr/>
         </p:nvPicPr>
         <p:blipFill>
-          <a:blip r:embed="rId4">
-            <a:extLst>
-              <a:ext uri="{28A0092B-C50C-407E-A947-70E740481C1C}">
-                <a14:useLocalDpi xmlns:a14="http://schemas.microsoft.com/office/drawing/2010/main" val="0"/>
-              </a:ext>
-            </a:extLst>
-          </a:blip>
+          <a:blip r:embed="rId4"/>
           <a:stretch>
             <a:fillRect/>
           </a:stretch>
         </p:blipFill>
         <p:spPr>
           <a:xfrm>
-            <a:off x="7943281" y="1468970"/>
-            <a:ext cx="4212081" cy="3331630"/>
+            <a:off x="8088623" y="1828229"/>
+            <a:ext cx="3989070" cy="3280410"/>
           </a:xfrm>
           <a:prstGeom prst="rect">
             <a:avLst/>
           </a:prstGeom>
         </p:spPr>
       </p:pic>
+      <p:sp>
+        <p:nvSpPr>
+          <p:cNvPr id="11" name="TextBox 10">
+            <a:extLst>
+              <a:ext uri="{FF2B5EF4-FFF2-40B4-BE49-F238E27FC236}">
+                <a16:creationId xmlns:a16="http://schemas.microsoft.com/office/drawing/2014/main" id="{546EF914-039A-E04C-AE2A-AD81D32EF16A}"/>
+              </a:ext>
+            </a:extLst>
+          </p:cNvPr>
+          <p:cNvSpPr txBox="1"/>
+          <p:nvPr/>
+        </p:nvSpPr>
+        <p:spPr>
+          <a:xfrm>
+            <a:off x="1482436" y="1094586"/>
+            <a:ext cx="1205346" cy="369332"/>
+          </a:xfrm>
+          <a:prstGeom prst="rect">
+            <a:avLst/>
+          </a:prstGeom>
+          <a:noFill/>
+        </p:spPr>
+        <p:txBody>
+          <a:bodyPr wrap="square" rtlCol="0">
+            <a:spAutoFit/>
+          </a:bodyPr>
+          <a:lstStyle/>
+          <a:p>
+            <a:pPr algn="ctr"/>
+            <a:r>
+              <a:rPr lang="en-US" dirty="0"/>
+              <a:t>2016</a:t>
+            </a:r>
+          </a:p>
+        </p:txBody>
+      </p:sp>
+      <p:sp>
+        <p:nvSpPr>
+          <p:cNvPr id="12" name="TextBox 11">
+            <a:extLst>
+              <a:ext uri="{FF2B5EF4-FFF2-40B4-BE49-F238E27FC236}">
+                <a16:creationId xmlns:a16="http://schemas.microsoft.com/office/drawing/2014/main" id="{9465D3B6-9369-324C-9DB0-2734BAF9EF3E}"/>
+              </a:ext>
+            </a:extLst>
+          </p:cNvPr>
+          <p:cNvSpPr txBox="1"/>
+          <p:nvPr/>
+        </p:nvSpPr>
+        <p:spPr>
+          <a:xfrm>
+            <a:off x="5652512" y="1094586"/>
+            <a:ext cx="1205346" cy="369332"/>
+          </a:xfrm>
+          <a:prstGeom prst="rect">
+            <a:avLst/>
+          </a:prstGeom>
+          <a:noFill/>
+        </p:spPr>
+        <p:txBody>
+          <a:bodyPr wrap="square" rtlCol="0">
+            <a:spAutoFit/>
+          </a:bodyPr>
+          <a:lstStyle/>
+          <a:p>
+            <a:pPr algn="ctr"/>
+            <a:r>
+              <a:rPr lang="en-US" dirty="0"/>
+              <a:t>2017</a:t>
+            </a:r>
+          </a:p>
+        </p:txBody>
+      </p:sp>
+      <p:sp>
+        <p:nvSpPr>
+          <p:cNvPr id="13" name="TextBox 12">
+            <a:extLst>
+              <a:ext uri="{FF2B5EF4-FFF2-40B4-BE49-F238E27FC236}">
+                <a16:creationId xmlns:a16="http://schemas.microsoft.com/office/drawing/2014/main" id="{4485BDAB-8259-E54A-A645-B6B9214E195F}"/>
+              </a:ext>
+            </a:extLst>
+          </p:cNvPr>
+          <p:cNvSpPr txBox="1"/>
+          <p:nvPr/>
+        </p:nvSpPr>
+        <p:spPr>
+          <a:xfrm>
+            <a:off x="9504218" y="1094586"/>
+            <a:ext cx="1205346" cy="369332"/>
+          </a:xfrm>
+          <a:prstGeom prst="rect">
+            <a:avLst/>
+          </a:prstGeom>
+          <a:noFill/>
+        </p:spPr>
+        <p:txBody>
+          <a:bodyPr wrap="square" rtlCol="0">
+            <a:spAutoFit/>
+          </a:bodyPr>
+          <a:lstStyle/>
+          <a:p>
+            <a:pPr algn="ctr"/>
+            <a:r>
+              <a:rPr lang="en-US" dirty="0"/>
+              <a:t>2018</a:t>
+            </a:r>
+          </a:p>
+        </p:txBody>
+      </p:sp>
     </p:spTree>
     <p:extLst>
       <p:ext uri="{BB962C8B-B14F-4D97-AF65-F5344CB8AC3E}">
-        <p14:creationId xmlns:p14="http://schemas.microsoft.com/office/powerpoint/2010/main" val="987917476"/>
+        <p14:creationId xmlns:p14="http://schemas.microsoft.com/office/powerpoint/2010/main" val="2079852111"/>
       </p:ext>
     </p:extLst>
   </p:cSld>

</xml_diff>